<commit_message>
Added gene-rna-protein correlation analysis
</commit_message>
<xml_diff>
--- a/pages/proteogenomics/Proteogenomic_searches/21.11.22_Proteogenomics_workshop_search.pptx
+++ b/pages/proteogenomics/Proteogenomic_searches/21.11.22_Proteogenomics_workshop_search.pptx
@@ -219,7 +219,7 @@
           <a:p>
             <a:fld id="{410750D1-DB39-4E10-A000-A82320FC4625}" type="datetimeFigureOut">
               <a:rPr lang="nb-NO" smtClean="0"/>
-              <a:t>22.11.2021</a:t>
+              <a:t>24.11.2021</a:t>
             </a:fld>
             <a:endParaRPr lang="nb-NO"/>
           </a:p>
@@ -1604,7 +1604,7 @@
           <a:p>
             <a:fld id="{A7CC7866-1118-4821-9EE0-087E8B36A260}" type="datetime1">
               <a:rPr lang="en-US" smtClean="0"/>
-              <a:t>11/22/2021</a:t>
+              <a:t>11/24/2021</a:t>
             </a:fld>
             <a:endParaRPr lang="en-US"/>
           </a:p>
@@ -1768,7 +1768,7 @@
           <a:p>
             <a:fld id="{01D56903-5AAD-455C-A7B6-E83443CF9F59}" type="datetime1">
               <a:rPr lang="en-US" smtClean="0"/>
-              <a:t>11/22/2021</a:t>
+              <a:t>11/24/2021</a:t>
             </a:fld>
             <a:endParaRPr lang="en-US"/>
           </a:p>
@@ -1942,7 +1942,7 @@
           <a:p>
             <a:fld id="{07836B96-C091-4415-94A1-6D3FE4D9E28D}" type="datetime1">
               <a:rPr lang="en-US" smtClean="0"/>
-              <a:t>11/22/2021</a:t>
+              <a:t>11/24/2021</a:t>
             </a:fld>
             <a:endParaRPr lang="en-US"/>
           </a:p>
@@ -2106,7 +2106,7 @@
           <a:p>
             <a:fld id="{CFD34426-5FD5-49DA-A90C-E322A362DEE1}" type="datetime1">
               <a:rPr lang="en-US" smtClean="0"/>
-              <a:t>11/22/2021</a:t>
+              <a:t>11/24/2021</a:t>
             </a:fld>
             <a:endParaRPr lang="en-US"/>
           </a:p>
@@ -2347,7 +2347,7 @@
           <a:p>
             <a:fld id="{8744A1CD-99E6-4A95-9652-F96F665FFE63}" type="datetime1">
               <a:rPr lang="en-US" smtClean="0"/>
-              <a:t>11/22/2021</a:t>
+              <a:t>11/24/2021</a:t>
             </a:fld>
             <a:endParaRPr lang="en-US"/>
           </a:p>
@@ -2628,7 +2628,7 @@
           <a:p>
             <a:fld id="{5F128EC0-4F29-4CA4-9B96-E5104DF80289}" type="datetime1">
               <a:rPr lang="en-US" smtClean="0"/>
-              <a:t>11/22/2021</a:t>
+              <a:t>11/24/2021</a:t>
             </a:fld>
             <a:endParaRPr lang="en-US"/>
           </a:p>
@@ -3043,7 +3043,7 @@
           <a:p>
             <a:fld id="{1B7206C8-9CBA-46AE-9FD3-95E80D9C356C}" type="datetime1">
               <a:rPr lang="en-US" smtClean="0"/>
-              <a:t>11/22/2021</a:t>
+              <a:t>11/24/2021</a:t>
             </a:fld>
             <a:endParaRPr lang="en-US"/>
           </a:p>
@@ -3156,7 +3156,7 @@
           <a:p>
             <a:fld id="{31DB85BC-889A-462A-968D-5A4368DA6C8D}" type="datetime1">
               <a:rPr lang="en-US" smtClean="0"/>
-              <a:t>11/22/2021</a:t>
+              <a:t>11/24/2021</a:t>
             </a:fld>
             <a:endParaRPr lang="en-US"/>
           </a:p>
@@ -3247,7 +3247,7 @@
           <a:p>
             <a:fld id="{AFF5E468-5990-4F6D-A10D-511B9DBB7EB9}" type="datetime1">
               <a:rPr lang="en-US" smtClean="0"/>
-              <a:t>11/22/2021</a:t>
+              <a:t>11/24/2021</a:t>
             </a:fld>
             <a:endParaRPr lang="en-US"/>
           </a:p>
@@ -3518,7 +3518,7 @@
           <a:p>
             <a:fld id="{BB3C9AA9-15B8-466E-9B2E-B913C4D9CB8C}" type="datetime1">
               <a:rPr lang="en-US" smtClean="0"/>
-              <a:t>11/22/2021</a:t>
+              <a:t>11/24/2021</a:t>
             </a:fld>
             <a:endParaRPr lang="en-US"/>
           </a:p>
@@ -3766,7 +3766,7 @@
           <a:p>
             <a:fld id="{506805E5-59A0-4599-9B88-83876B3CDAEA}" type="datetime1">
               <a:rPr lang="en-US" smtClean="0"/>
-              <a:t>11/22/2021</a:t>
+              <a:t>11/24/2021</a:t>
             </a:fld>
             <a:endParaRPr lang="en-US"/>
           </a:p>
@@ -3973,7 +3973,7 @@
           <a:p>
             <a:fld id="{BDF845AA-3E2D-4CA0-BAFA-3C4E3B985540}" type="datetime1">
               <a:rPr lang="en-US" smtClean="0"/>
-              <a:t>11/22/2021</a:t>
+              <a:t>11/24/2021</a:t>
             </a:fld>
             <a:endParaRPr lang="en-US"/>
           </a:p>

</xml_diff>